<commit_message>
add slide from ege
</commit_message>
<xml_diff>
--- a/PRESENTATIONS/2024-09-tpac/2024-09-26-WoT-TPAC-UseCases-Mizushima.pptx
+++ b/PRESENTATIONS/2024-09-tpac/2024-09-26-WoT-TPAC-UseCases-Mizushima.pptx
@@ -5,7 +5,7 @@
     <p:sldMasterId id="2147483648" r:id="rId1"/>
   </p:sldMasterIdLst>
   <p:notesMasterIdLst>
-    <p:notesMasterId r:id="rId7"/>
+    <p:notesMasterId r:id="rId8"/>
   </p:notesMasterIdLst>
   <p:sldIdLst>
     <p:sldId id="256" r:id="rId2"/>
@@ -13,6 +13,7 @@
     <p:sldId id="258" r:id="rId4"/>
     <p:sldId id="259" r:id="rId5"/>
     <p:sldId id="260" r:id="rId6"/>
+    <p:sldId id="261" r:id="rId7"/>
   </p:sldIdLst>
   <p:sldSz cx="12192000" cy="6858000"/>
   <p:notesSz cx="6858000" cy="9144000"/>
@@ -6653,6 +6654,316 @@
     <p:extLst>
       <p:ext uri="{BB962C8B-B14F-4D97-AF65-F5344CB8AC3E}">
         <p14:creationId xmlns:p14="http://schemas.microsoft.com/office/powerpoint/2010/main" val="1645429390"/>
+      </p:ext>
+    </p:extLst>
+  </p:cSld>
+  <p:clrMapOvr>
+    <a:masterClrMapping/>
+  </p:clrMapOvr>
+</p:sld>
+</file>
+
+<file path=ppt/slides/slide6.xml><?xml version="1.0" encoding="utf-8"?>
+<p:sld xmlns:a="http://schemas.openxmlformats.org/drawingml/2006/main" xmlns:r="http://schemas.openxmlformats.org/officeDocument/2006/relationships" xmlns:p="http://schemas.openxmlformats.org/presentationml/2006/main">
+  <p:cSld>
+    <p:spTree>
+      <p:nvGrpSpPr>
+        <p:cNvPr id="1" name=""/>
+        <p:cNvGrpSpPr/>
+        <p:nvPr/>
+      </p:nvGrpSpPr>
+      <p:grpSpPr>
+        <a:xfrm>
+          <a:off x="0" y="0"/>
+          <a:ext cx="0" cy="0"/>
+          <a:chOff x="0" y="0"/>
+          <a:chExt cx="0" cy="0"/>
+        </a:xfrm>
+      </p:grpSpPr>
+      <p:sp>
+        <p:nvSpPr>
+          <p:cNvPr id="2" name="Title 1">
+            <a:extLst>
+              <a:ext uri="{FF2B5EF4-FFF2-40B4-BE49-F238E27FC236}">
+                <a16:creationId xmlns:a16="http://schemas.microsoft.com/office/drawing/2014/main" id="{5CC4ED2C-7FE5-0BF0-945C-D719DF108460}"/>
+              </a:ext>
+            </a:extLst>
+          </p:cNvPr>
+          <p:cNvSpPr>
+            <a:spLocks noGrp="1"/>
+          </p:cNvSpPr>
+          <p:nvPr>
+            <p:ph type="title"/>
+          </p:nvPr>
+        </p:nvSpPr>
+        <p:spPr/>
+        <p:txBody>
+          <a:bodyPr/>
+          <a:lstStyle/>
+          <a:p>
+            <a:r>
+              <a:rPr lang="en-US" dirty="0"/>
+              <a:t>Trial by the TD Task Force</a:t>
+            </a:r>
+          </a:p>
+        </p:txBody>
+      </p:sp>
+      <p:sp>
+        <p:nvSpPr>
+          <p:cNvPr id="3" name="Content Placeholder 2">
+            <a:extLst>
+              <a:ext uri="{FF2B5EF4-FFF2-40B4-BE49-F238E27FC236}">
+                <a16:creationId xmlns:a16="http://schemas.microsoft.com/office/drawing/2014/main" id="{7FDA77D8-3494-2843-9938-6F4CBAF7B587}"/>
+              </a:ext>
+            </a:extLst>
+          </p:cNvPr>
+          <p:cNvSpPr>
+            <a:spLocks noGrp="1"/>
+          </p:cNvSpPr>
+          <p:nvPr>
+            <p:ph idx="1"/>
+          </p:nvPr>
+        </p:nvSpPr>
+        <p:spPr/>
+        <p:txBody>
+          <a:bodyPr>
+            <a:normAutofit/>
+          </a:bodyPr>
+          <a:lstStyle/>
+          <a:p>
+            <a:r>
+              <a:rPr lang="en-US" dirty="0"/>
+              <a:t>TD Task Force wants to use the Use Case process to turn “worthy” issues into use cases</a:t>
+            </a:r>
+          </a:p>
+          <a:p>
+            <a:r>
+              <a:rPr lang="en-US" dirty="0"/>
+              <a:t>Three trials were done so far. </a:t>
+            </a:r>
+          </a:p>
+          <a:p>
+            <a:pPr lvl="1" fontAlgn="base"/>
+            <a:r>
+              <a:rPr lang="en-GB" dirty="0"/>
+              <a:t>Daniel </a:t>
+            </a:r>
+            <a:r>
+              <a:rPr lang="en-GB" dirty="0" err="1"/>
+              <a:t>Peintner</a:t>
+            </a:r>
+            <a:r>
+              <a:rPr lang="en-GB" dirty="0"/>
+              <a:t>: 	Writing to a Property Request returns a response. </a:t>
+            </a:r>
+            <a:r>
+              <a:rPr lang="en-GB" u="sng" dirty="0">
+                <a:solidFill>
+                  <a:srgbClr val="0097A7"/>
+                </a:solidFill>
+                <a:hlinkClick r:id="rId2">
+                  <a:extLst>
+                    <a:ext uri="{A12FA001-AC4F-418D-AE19-62706E023703}">
+                      <ahyp:hlinkClr xmlns:ahyp="http://schemas.microsoft.com/office/drawing/2018/hyperlinkcolor" val="tx"/>
+                    </a:ext>
+                  </a:extLst>
+                </a:hlinkClick>
+              </a:rPr>
+              <a:t>Link</a:t>
+            </a:r>
+            <a:endParaRPr lang="en-GB" u="sng" dirty="0">
+              <a:solidFill>
+                <a:srgbClr val="0097A7"/>
+              </a:solidFill>
+            </a:endParaRPr>
+          </a:p>
+          <a:p>
+            <a:pPr lvl="1" fontAlgn="base"/>
+            <a:r>
+              <a:rPr lang="en-GB" dirty="0"/>
+              <a:t>Jan </a:t>
+            </a:r>
+            <a:r>
+              <a:rPr lang="en-GB" dirty="0" err="1"/>
+              <a:t>Romann</a:t>
+            </a:r>
+            <a:r>
+              <a:rPr lang="en-GB" dirty="0"/>
+              <a:t>: 	Simplifying security descriptions. </a:t>
+            </a:r>
+            <a:r>
+              <a:rPr lang="en-GB" u="sng" dirty="0">
+                <a:solidFill>
+                  <a:srgbClr val="0097A7"/>
+                </a:solidFill>
+                <a:hlinkClick r:id="rId3">
+                  <a:extLst>
+                    <a:ext uri="{A12FA001-AC4F-418D-AE19-62706E023703}">
+                      <ahyp:hlinkClr xmlns:ahyp="http://schemas.microsoft.com/office/drawing/2018/hyperlinkcolor" val="tx"/>
+                    </a:ext>
+                  </a:extLst>
+                </a:hlinkClick>
+              </a:rPr>
+              <a:t>Link</a:t>
+            </a:r>
+            <a:endParaRPr lang="en-GB" u="sng" dirty="0">
+              <a:solidFill>
+                <a:srgbClr val="0097A7"/>
+              </a:solidFill>
+            </a:endParaRPr>
+          </a:p>
+          <a:p>
+            <a:pPr lvl="1" fontAlgn="base"/>
+            <a:r>
+              <a:rPr lang="en-GB" dirty="0"/>
+              <a:t>Luca </a:t>
+            </a:r>
+            <a:r>
+              <a:rPr lang="en-GB" dirty="0" err="1"/>
+              <a:t>Barbato</a:t>
+            </a:r>
+            <a:r>
+              <a:rPr lang="en-GB" dirty="0"/>
+              <a:t>: 	Profiles for converging interoperability. </a:t>
+            </a:r>
+            <a:r>
+              <a:rPr lang="en-GB" b="0" i="0" u="sng" strike="noStrike" dirty="0">
+                <a:solidFill>
+                  <a:srgbClr val="0097A7"/>
+                </a:solidFill>
+                <a:effectLst/>
+                <a:hlinkClick r:id="rId4"/>
+              </a:rPr>
+              <a:t>Link</a:t>
+            </a:r>
+            <a:endParaRPr lang="en-GB" b="0" i="0" u="sng" strike="noStrike" dirty="0">
+              <a:solidFill>
+                <a:srgbClr val="0097A7"/>
+              </a:solidFill>
+              <a:effectLst/>
+            </a:endParaRPr>
+          </a:p>
+          <a:p>
+            <a:pPr fontAlgn="base"/>
+            <a:r>
+              <a:rPr lang="en-GB" dirty="0"/>
+              <a:t>Experience Summary: We need to be able to extract the scenario, user story. Something more high-level to motivate the work on it. We should hold back the technical solution in the first level or step.</a:t>
+            </a:r>
+          </a:p>
+          <a:p>
+            <a:pPr fontAlgn="base"/>
+            <a:r>
+              <a:rPr lang="en-GB" dirty="0"/>
+              <a:t>More on this in tomorrow’s TD session. </a:t>
+            </a:r>
+            <a:r>
+              <a:rPr lang="en-GB" dirty="0">
+                <a:hlinkClick r:id="rId5"/>
+              </a:rPr>
+              <a:t>Slides link</a:t>
+            </a:r>
+            <a:endParaRPr lang="en-GB" sz="1600" dirty="0"/>
+          </a:p>
+          <a:p>
+            <a:pPr lvl="1" fontAlgn="base"/>
+            <a:endParaRPr lang="en-GB" sz="2000" dirty="0"/>
+          </a:p>
+          <a:p>
+            <a:pPr lvl="1"/>
+            <a:endParaRPr lang="en-US" dirty="0"/>
+          </a:p>
+        </p:txBody>
+      </p:sp>
+      <p:sp>
+        <p:nvSpPr>
+          <p:cNvPr id="4" name="Footer Placeholder 3">
+            <a:extLst>
+              <a:ext uri="{FF2B5EF4-FFF2-40B4-BE49-F238E27FC236}">
+                <a16:creationId xmlns:a16="http://schemas.microsoft.com/office/drawing/2014/main" id="{D875E170-52DE-6087-8AEB-E914074125AC}"/>
+              </a:ext>
+            </a:extLst>
+          </p:cNvPr>
+          <p:cNvSpPr>
+            <a:spLocks noGrp="1"/>
+          </p:cNvSpPr>
+          <p:nvPr>
+            <p:ph type="ftr" sz="quarter" idx="11"/>
+          </p:nvPr>
+        </p:nvSpPr>
+        <p:spPr/>
+        <p:txBody>
+          <a:bodyPr/>
+          <a:lstStyle/>
+          <a:p>
+            <a:r>
+              <a:rPr lang="en-US"/>
+              <a:t>W3C Web of Things (WoT) WG/IG – TPAC 2024</a:t>
+            </a:r>
+          </a:p>
+        </p:txBody>
+      </p:sp>
+      <p:sp>
+        <p:nvSpPr>
+          <p:cNvPr id="5" name="Slide Number Placeholder 4">
+            <a:extLst>
+              <a:ext uri="{FF2B5EF4-FFF2-40B4-BE49-F238E27FC236}">
+                <a16:creationId xmlns:a16="http://schemas.microsoft.com/office/drawing/2014/main" id="{E5E8188A-E031-093B-9846-7E8A00248A25}"/>
+              </a:ext>
+            </a:extLst>
+          </p:cNvPr>
+          <p:cNvSpPr>
+            <a:spLocks noGrp="1"/>
+          </p:cNvSpPr>
+          <p:nvPr>
+            <p:ph type="sldNum" sz="quarter" idx="12"/>
+          </p:nvPr>
+        </p:nvSpPr>
+        <p:spPr/>
+        <p:txBody>
+          <a:bodyPr/>
+          <a:lstStyle/>
+          <a:p>
+            <a:fld id="{055BDE2E-7167-1944-9FEE-E44668D91CB6}" type="slidenum">
+              <a:rPr lang="en-US" smtClean="0"/>
+              <a:t>6</a:t>
+            </a:fld>
+            <a:endParaRPr lang="en-US"/>
+          </a:p>
+        </p:txBody>
+      </p:sp>
+      <p:sp>
+        <p:nvSpPr>
+          <p:cNvPr id="6" name="Date Placeholder 5">
+            <a:extLst>
+              <a:ext uri="{FF2B5EF4-FFF2-40B4-BE49-F238E27FC236}">
+                <a16:creationId xmlns:a16="http://schemas.microsoft.com/office/drawing/2014/main" id="{2C6B56BE-8523-1B3F-F5EB-88941119277C}"/>
+              </a:ext>
+            </a:extLst>
+          </p:cNvPr>
+          <p:cNvSpPr>
+            <a:spLocks noGrp="1"/>
+          </p:cNvSpPr>
+          <p:nvPr>
+            <p:ph type="dt" sz="half" idx="10"/>
+          </p:nvPr>
+        </p:nvSpPr>
+        <p:spPr/>
+        <p:txBody>
+          <a:bodyPr/>
+          <a:lstStyle/>
+          <a:p>
+            <a:r>
+              <a:rPr lang="en-US" altLang="ja-JP"/>
+              <a:t>2024-09-26</a:t>
+            </a:r>
+            <a:endParaRPr lang="en-US"/>
+          </a:p>
+        </p:txBody>
+      </p:sp>
+    </p:spTree>
+    <p:extLst>
+      <p:ext uri="{BB962C8B-B14F-4D97-AF65-F5344CB8AC3E}">
+        <p14:creationId xmlns:p14="http://schemas.microsoft.com/office/powerpoint/2010/main" val="3863515742"/>
       </p:ext>
     </p:extLst>
   </p:cSld>
@@ -7221,5 +7532,6 @@
 <file path=docMetadata/LabelInfo.xml><?xml version="1.0" encoding="utf-8"?>
 <clbl:labelList xmlns:clbl="http://schemas.microsoft.com/office/2020/mipLabelMetadata">
   <clbl:label id="{46c98d88-e344-4ed4-8496-4ed7712e255d}" enabled="0" method="" siteId="{46c98d88-e344-4ed4-8496-4ed7712e255d}" removed="1"/>
+  <clbl:label id="{9d258917-277f-42cd-a3cd-14c4e9ee58bc}" enabled="1" method="Standard" siteId="{38ae3bcd-9579-4fd4-adda-b42e1495d55a}" contentBits="0" removed="0"/>
 </clbl:labelList>
 </file>
</xml_diff>